<commit_message>
Added Joe Garcia's code
</commit_message>
<xml_diff>
--- a/DATA 607 Project 3 - Group 5.pptx
+++ b/DATA 607 Project 3 - Group 5.pptx
@@ -8140,6 +8140,40 @@
             </a:r>
             <a:endParaRPr/>
           </a:p>
+          <a:p>
+            <a:pPr indent="-311150" lvl="0" marL="457200" rtl="0" algn="l">
+              <a:spcBef>
+                <a:spcPts val="0"/>
+              </a:spcBef>
+              <a:spcAft>
+                <a:spcPts val="0"/>
+              </a:spcAft>
+              <a:buSzPts val="1300"/>
+              <a:buChar char="●"/>
+            </a:pPr>
+            <a:r>
+              <a:rPr lang="en"/>
+              <a:t>Laura B</a:t>
+            </a:r>
+            <a:endParaRPr/>
+          </a:p>
+          <a:p>
+            <a:pPr indent="-311150" lvl="0" marL="457200" rtl="0" algn="l">
+              <a:spcBef>
+                <a:spcPts val="0"/>
+              </a:spcBef>
+              <a:spcAft>
+                <a:spcPts val="0"/>
+              </a:spcAft>
+              <a:buSzPts val="1300"/>
+              <a:buChar char="●"/>
+            </a:pPr>
+            <a:r>
+              <a:rPr lang="en"/>
+              <a:t>Daniel Craig</a:t>
+            </a:r>
+            <a:endParaRPr/>
+          </a:p>
         </p:txBody>
       </p:sp>
     </p:spTree>
@@ -8727,11 +8761,11 @@
         </p:spPr>
         <p:txBody>
           <a:bodyPr anchorCtr="0" anchor="t" bIns="91425" lIns="91425" spcFirstLastPara="1" rIns="91425" wrap="square" tIns="91425">
-            <a:normAutofit fontScale="70000" lnSpcReduction="20000"/>
+            <a:normAutofit fontScale="47500" lnSpcReduction="20000"/>
           </a:bodyPr>
           <a:lstStyle/>
           <a:p>
-            <a:pPr indent="-286385" lvl="0" marL="457200" rtl="0" algn="l">
+            <a:pPr indent="-267811" lvl="0" marL="457200" rtl="0" algn="l">
               <a:spcBef>
                 <a:spcPts val="0"/>
               </a:spcBef>
@@ -8743,12 +8777,12 @@
             </a:pPr>
             <a:r>
               <a:rPr lang="en"/>
-              <a:t>Website (Data source)</a:t>
+              <a:t>Job Board</a:t>
             </a:r>
             <a:endParaRPr/>
           </a:p>
           <a:p>
-            <a:pPr indent="-277494" lvl="1" marL="914400" rtl="0" algn="l">
+            <a:pPr indent="-261778" lvl="1" marL="914400" rtl="0" algn="l">
               <a:spcBef>
                 <a:spcPts val="0"/>
               </a:spcBef>
@@ -8760,12 +8794,46 @@
             </a:pPr>
             <a:r>
               <a:rPr lang="en"/>
-              <a:t>Website Names</a:t>
+              <a:t>Job Board ID</a:t>
             </a:r>
             <a:endParaRPr/>
           </a:p>
           <a:p>
-            <a:pPr indent="-286385" lvl="0" marL="457200" rtl="0" algn="l">
+            <a:pPr indent="-261778" lvl="1" marL="914400" rtl="0" algn="l">
+              <a:spcBef>
+                <a:spcPts val="0"/>
+              </a:spcBef>
+              <a:spcAft>
+                <a:spcPts val="0"/>
+              </a:spcAft>
+              <a:buSzPct val="100000"/>
+              <a:buChar char="○"/>
+            </a:pPr>
+            <a:r>
+              <a:rPr lang="en"/>
+              <a:t>Job Board Name</a:t>
+            </a:r>
+            <a:endParaRPr/>
+          </a:p>
+          <a:p>
+            <a:pPr indent="-261778" lvl="1" marL="914400" rtl="0" algn="l">
+              <a:spcBef>
+                <a:spcPts val="0"/>
+              </a:spcBef>
+              <a:spcAft>
+                <a:spcPts val="0"/>
+              </a:spcAft>
+              <a:buSzPct val="100000"/>
+              <a:buChar char="○"/>
+            </a:pPr>
+            <a:r>
+              <a:rPr lang="en"/>
+              <a:t>Job Board URL</a:t>
+            </a:r>
+            <a:endParaRPr/>
+          </a:p>
+          <a:p>
+            <a:pPr indent="-267811" lvl="0" marL="457200" rtl="0" algn="l">
               <a:spcBef>
                 <a:spcPts val="0"/>
               </a:spcBef>
@@ -8782,7 +8850,7 @@
             <a:endParaRPr/>
           </a:p>
           <a:p>
-            <a:pPr indent="-277494" lvl="1" marL="914400" rtl="0" algn="l">
+            <a:pPr indent="-261778" lvl="1" marL="914400" rtl="0" algn="l">
               <a:spcBef>
                 <a:spcPts val="0"/>
               </a:spcBef>
@@ -8799,7 +8867,7 @@
             <a:endParaRPr/>
           </a:p>
           <a:p>
-            <a:pPr indent="-277494" lvl="1" marL="914400" rtl="0" algn="l">
+            <a:pPr indent="-261778" lvl="1" marL="914400" rtl="0" algn="l">
               <a:spcBef>
                 <a:spcPts val="0"/>
               </a:spcBef>
@@ -8816,7 +8884,7 @@
             <a:endParaRPr/>
           </a:p>
           <a:p>
-            <a:pPr indent="-277494" lvl="1" marL="914400" rtl="0" algn="l">
+            <a:pPr indent="-261778" lvl="1" marL="914400" rtl="0" algn="l">
               <a:spcBef>
                 <a:spcPts val="0"/>
               </a:spcBef>
@@ -8828,12 +8896,29 @@
             </a:pPr>
             <a:r>
               <a:rPr lang="en"/>
+              <a:t>Industry ID</a:t>
+            </a:r>
+            <a:endParaRPr/>
+          </a:p>
+          <a:p>
+            <a:pPr indent="-261778" lvl="1" marL="914400" rtl="0" algn="l">
+              <a:spcBef>
+                <a:spcPts val="0"/>
+              </a:spcBef>
+              <a:spcAft>
+                <a:spcPts val="0"/>
+              </a:spcAft>
+              <a:buSzPct val="100000"/>
+              <a:buChar char="○"/>
+            </a:pPr>
+            <a:r>
+              <a:rPr lang="en"/>
               <a:t>Location </a:t>
             </a:r>
             <a:endParaRPr/>
           </a:p>
           <a:p>
-            <a:pPr indent="-286385" lvl="0" marL="457200" rtl="0" algn="l">
+            <a:pPr indent="-267811" lvl="0" marL="457200" rtl="0" algn="l">
               <a:spcBef>
                 <a:spcPts val="0"/>
               </a:spcBef>
@@ -8850,7 +8935,7 @@
             <a:endParaRPr/>
           </a:p>
           <a:p>
-            <a:pPr indent="-277494" lvl="1" marL="914400" rtl="0" algn="l">
+            <a:pPr indent="-261778" lvl="1" marL="914400" rtl="0" algn="l">
               <a:spcBef>
                 <a:spcPts val="0"/>
               </a:spcBef>
@@ -8867,7 +8952,7 @@
             <a:endParaRPr/>
           </a:p>
           <a:p>
-            <a:pPr indent="-277494" lvl="1" marL="914400" rtl="0" algn="l">
+            <a:pPr indent="-261778" lvl="1" marL="914400" rtl="0" algn="l">
               <a:spcBef>
                 <a:spcPts val="0"/>
               </a:spcBef>
@@ -8884,7 +8969,7 @@
             <a:endParaRPr/>
           </a:p>
           <a:p>
-            <a:pPr indent="-277494" lvl="1" marL="914400" rtl="0" algn="l">
+            <a:pPr indent="-261778" lvl="1" marL="914400" rtl="0" algn="l">
               <a:spcBef>
                 <a:spcPts val="0"/>
               </a:spcBef>
@@ -8901,7 +8986,7 @@
             <a:endParaRPr/>
           </a:p>
           <a:p>
-            <a:pPr indent="-277494" lvl="1" marL="914400" rtl="0" algn="l">
+            <a:pPr indent="-261778" lvl="1" marL="914400" rtl="0" algn="l">
               <a:spcBef>
                 <a:spcPts val="0"/>
               </a:spcBef>
@@ -8918,7 +9003,7 @@
             <a:endParaRPr/>
           </a:p>
           <a:p>
-            <a:pPr indent="-277494" lvl="1" marL="914400" rtl="0" algn="l">
+            <a:pPr indent="-261778" lvl="1" marL="914400" rtl="0" algn="l">
               <a:spcBef>
                 <a:spcPts val="0"/>
               </a:spcBef>
@@ -8935,7 +9020,7 @@
             <a:endParaRPr/>
           </a:p>
           <a:p>
-            <a:pPr indent="-277494" lvl="1" marL="914400" rtl="0" algn="l">
+            <a:pPr indent="-261778" lvl="1" marL="914400" rtl="0" algn="l">
               <a:spcBef>
                 <a:spcPts val="0"/>
               </a:spcBef>
@@ -8952,7 +9037,7 @@
             <a:endParaRPr/>
           </a:p>
           <a:p>
-            <a:pPr indent="-277494" lvl="1" marL="914400" rtl="0" algn="l">
+            <a:pPr indent="-260270" lvl="1" marL="914400" rtl="0" algn="l">
               <a:spcBef>
                 <a:spcPts val="0"/>
               </a:spcBef>
@@ -8963,13 +9048,34 @@
               <a:buChar char="○"/>
             </a:pPr>
             <a:r>
+              <a:rPr lang="en" sz="1050"/>
+              <a:t>Remote vs. On-Location vs. Hybrid </a:t>
+            </a:r>
+            <a:endParaRPr sz="1050"/>
+          </a:p>
+          <a:p>
+            <a:pPr indent="-267811" lvl="0" marL="457200" rtl="0" algn="l">
+              <a:spcBef>
+                <a:spcPts val="0"/>
+              </a:spcBef>
+              <a:spcAft>
+                <a:spcPts val="0"/>
+              </a:spcAft>
+              <a:buSzPct val="100000"/>
+              <a:buChar char="●"/>
+            </a:pPr>
+            <a:r>
               <a:rPr lang="en"/>
-              <a:t>Skills</a:t>
+              <a:t>Job Skill</a:t>
+            </a:r>
+            <a:r>
+              <a:rPr lang="en"/>
+              <a:t>: </a:t>
             </a:r>
             <a:endParaRPr/>
           </a:p>
           <a:p>
-            <a:pPr indent="-277494" lvl="1" marL="914400" rtl="0" algn="l">
+            <a:pPr indent="-261778" lvl="1" marL="914400" rtl="0" algn="l">
               <a:spcBef>
                 <a:spcPts val="0"/>
               </a:spcBef>
@@ -8981,12 +9087,12 @@
             </a:pPr>
             <a:r>
               <a:rPr lang="en"/>
-              <a:t>Skill Category ID</a:t>
+              <a:t>Job Posting ID</a:t>
             </a:r>
             <a:endParaRPr/>
           </a:p>
           <a:p>
-            <a:pPr indent="-275272" lvl="1" marL="914400" rtl="0" algn="l">
+            <a:pPr indent="-261778" lvl="1" marL="914400" rtl="0" algn="l">
               <a:spcBef>
                 <a:spcPts val="0"/>
               </a:spcBef>
@@ -8997,13 +9103,47 @@
               <a:buChar char="○"/>
             </a:pPr>
             <a:r>
-              <a:rPr lang="en" sz="1050"/>
-              <a:t>Remote vs. On-Location vs. Hybrid </a:t>
-            </a:r>
-            <a:endParaRPr sz="1050"/>
-          </a:p>
-          <a:p>
-            <a:pPr indent="-286385" lvl="0" marL="457200" rtl="0" algn="l">
+              <a:rPr lang="en"/>
+              <a:t>Skill D</a:t>
+            </a:r>
+            <a:endParaRPr/>
+          </a:p>
+          <a:p>
+            <a:pPr indent="-261778" lvl="1" marL="914400" rtl="0" algn="l">
+              <a:spcBef>
+                <a:spcPts val="0"/>
+              </a:spcBef>
+              <a:spcAft>
+                <a:spcPts val="0"/>
+              </a:spcAft>
+              <a:buSzPct val="100000"/>
+              <a:buChar char="○"/>
+            </a:pPr>
+            <a:r>
+              <a:rPr lang="en"/>
+              <a:t>Skill Name</a:t>
+            </a:r>
+            <a:endParaRPr/>
+          </a:p>
+          <a:p>
+            <a:pPr indent="-261778" lvl="1" marL="914400" rtl="0" algn="l">
+              <a:spcBef>
+                <a:spcPts val="0"/>
+              </a:spcBef>
+              <a:spcAft>
+                <a:spcPts val="0"/>
+              </a:spcAft>
+              <a:buSzPct val="100000"/>
+              <a:buChar char="○"/>
+            </a:pPr>
+            <a:r>
+              <a:rPr lang="en"/>
+              <a:t>Skill Type</a:t>
+            </a:r>
+            <a:endParaRPr/>
+          </a:p>
+          <a:p>
+            <a:pPr indent="-267811" lvl="0" marL="457200" rtl="0" algn="l">
               <a:spcBef>
                 <a:spcPts val="0"/>
               </a:spcBef>
@@ -9015,7 +9155,41 @@
             </a:pPr>
             <a:r>
               <a:rPr lang="en"/>
-              <a:t>Skill Category: Soft Skills, Technical, Etc. </a:t>
+              <a:t>Industry</a:t>
+            </a:r>
+            <a:endParaRPr/>
+          </a:p>
+          <a:p>
+            <a:pPr indent="-261778" lvl="1" marL="914400" rtl="0" algn="l">
+              <a:spcBef>
+                <a:spcPts val="0"/>
+              </a:spcBef>
+              <a:spcAft>
+                <a:spcPts val="0"/>
+              </a:spcAft>
+              <a:buSzPct val="100000"/>
+              <a:buChar char="○"/>
+            </a:pPr>
+            <a:r>
+              <a:rPr lang="en"/>
+              <a:t>Industry ID</a:t>
+            </a:r>
+            <a:endParaRPr/>
+          </a:p>
+          <a:p>
+            <a:pPr indent="-261778" lvl="1" marL="914400" rtl="0" algn="l">
+              <a:spcBef>
+                <a:spcPts val="0"/>
+              </a:spcBef>
+              <a:spcAft>
+                <a:spcPts val="0"/>
+              </a:spcAft>
+              <a:buSzPct val="100000"/>
+              <a:buChar char="○"/>
+            </a:pPr>
+            <a:r>
+              <a:rPr lang="en"/>
+              <a:t>Industry</a:t>
             </a:r>
             <a:endParaRPr/>
           </a:p>

</xml_diff>